<commit_message>
updates to live from test
</commit_message>
<xml_diff>
--- a/examples/REST Request Authentication_V1.pptx
+++ b/examples/REST Request Authentication_V1.pptx
@@ -481,7 +481,7 @@
             <a:fld id="{7C9CD848-6AB1-D245-ACA7-F72CCE1E806D}" type="datetimeFigureOut">
               <a:rPr lang="en-US" smtClean="0"/>
               <a:pPr/>
-              <a:t>6/18/2018</a:t>
+              <a:t>1/7/2019</a:t>
             </a:fld>
             <a:endParaRPr lang="en-US" dirty="0"/>
           </a:p>
@@ -1822,7 +1822,7 @@
           <a:p>
             <a:fld id="{7C9CD848-6AB1-D245-ACA7-F72CCE1E806D}" type="datetimeFigureOut">
               <a:rPr lang="en-US" smtClean="0"/>
-              <a:t>6/18/2018</a:t>
+              <a:t>1/7/2019</a:t>
             </a:fld>
             <a:endParaRPr lang="en-US"/>
           </a:p>
@@ -1955,7 +1955,7 @@
           <a:p>
             <a:fld id="{7C9CD848-6AB1-D245-ACA7-F72CCE1E806D}" type="datetimeFigureOut">
               <a:rPr lang="en-US" smtClean="0"/>
-              <a:t>6/18/2018</a:t>
+              <a:t>1/7/2019</a:t>
             </a:fld>
             <a:endParaRPr lang="en-US"/>
           </a:p>
@@ -2066,7 +2066,7 @@
           <a:p>
             <a:fld id="{7C9CD848-6AB1-D245-ACA7-F72CCE1E806D}" type="datetimeFigureOut">
               <a:rPr lang="en-US" smtClean="0"/>
-              <a:t>6/18/2018</a:t>
+              <a:t>1/7/2019</a:t>
             </a:fld>
             <a:endParaRPr lang="en-US"/>
           </a:p>
@@ -6036,7 +6036,7 @@
             <a:pPr lvl="1"/>
             <a:r>
               <a:rPr lang="en-IE" sz="1500" dirty="0"/>
-              <a:t>The 'String to be signed' is signed with the private key that accompanies the X509 certificate associated with the '</a:t>
+              <a:t>The 'String to be signed' is signed with the private key that accompanies the X509 certificate with the '</a:t>
             </a:r>
             <a:r>
               <a:rPr lang="en-IE" sz="1500" dirty="0" err="1"/>
@@ -6133,7 +6133,7 @@
                   <a:srgbClr val="0070C0"/>
                 </a:solidFill>
               </a:rPr>
-              <a:t>		host: localhost:8080\n</a:t>
+              <a:t>		host: www.ros.ie\n</a:t>
             </a:r>
           </a:p>
           <a:p>

</xml_diff>